<commit_message>
Slight update to sampling cheatsheet
</commit_message>
<xml_diff>
--- a/Statistical_modelling/Introduction/notes/Sampling and asymptotics cheatsheet.pptx
+++ b/Statistical_modelling/Introduction/notes/Sampling and asymptotics cheatsheet.pptx
@@ -243,7 +243,7 @@
           <a:p>
             <a:fld id="{6E72D33E-813A-6147-8BDB-1CDA0AB2F90F}" type="datetimeFigureOut">
               <a:rPr lang="en-US" smtClean="0"/>
-              <a:t>11/10/21</a:t>
+              <a:t>11/11/21</a:t>
             </a:fld>
             <a:endParaRPr lang="en-US"/>
           </a:p>
@@ -413,7 +413,7 @@
           <a:p>
             <a:fld id="{6E72D33E-813A-6147-8BDB-1CDA0AB2F90F}" type="datetimeFigureOut">
               <a:rPr lang="en-US" smtClean="0"/>
-              <a:t>11/10/21</a:t>
+              <a:t>11/11/21</a:t>
             </a:fld>
             <a:endParaRPr lang="en-US"/>
           </a:p>
@@ -593,7 +593,7 @@
           <a:p>
             <a:fld id="{6E72D33E-813A-6147-8BDB-1CDA0AB2F90F}" type="datetimeFigureOut">
               <a:rPr lang="en-US" smtClean="0"/>
-              <a:t>11/10/21</a:t>
+              <a:t>11/11/21</a:t>
             </a:fld>
             <a:endParaRPr lang="en-US"/>
           </a:p>
@@ -763,7 +763,7 @@
           <a:p>
             <a:fld id="{6E72D33E-813A-6147-8BDB-1CDA0AB2F90F}" type="datetimeFigureOut">
               <a:rPr lang="en-US" smtClean="0"/>
-              <a:t>11/10/21</a:t>
+              <a:t>11/11/21</a:t>
             </a:fld>
             <a:endParaRPr lang="en-US"/>
           </a:p>
@@ -1007,7 +1007,7 @@
           <a:p>
             <a:fld id="{6E72D33E-813A-6147-8BDB-1CDA0AB2F90F}" type="datetimeFigureOut">
               <a:rPr lang="en-US" smtClean="0"/>
-              <a:t>11/10/21</a:t>
+              <a:t>11/11/21</a:t>
             </a:fld>
             <a:endParaRPr lang="en-US"/>
           </a:p>
@@ -1239,7 +1239,7 @@
           <a:p>
             <a:fld id="{6E72D33E-813A-6147-8BDB-1CDA0AB2F90F}" type="datetimeFigureOut">
               <a:rPr lang="en-US" smtClean="0"/>
-              <a:t>11/10/21</a:t>
+              <a:t>11/11/21</a:t>
             </a:fld>
             <a:endParaRPr lang="en-US"/>
           </a:p>
@@ -1606,7 +1606,7 @@
           <a:p>
             <a:fld id="{6E72D33E-813A-6147-8BDB-1CDA0AB2F90F}" type="datetimeFigureOut">
               <a:rPr lang="en-US" smtClean="0"/>
-              <a:t>11/10/21</a:t>
+              <a:t>11/11/21</a:t>
             </a:fld>
             <a:endParaRPr lang="en-US"/>
           </a:p>
@@ -1724,7 +1724,7 @@
           <a:p>
             <a:fld id="{6E72D33E-813A-6147-8BDB-1CDA0AB2F90F}" type="datetimeFigureOut">
               <a:rPr lang="en-US" smtClean="0"/>
-              <a:t>11/10/21</a:t>
+              <a:t>11/11/21</a:t>
             </a:fld>
             <a:endParaRPr lang="en-US"/>
           </a:p>
@@ -1819,7 +1819,7 @@
           <a:p>
             <a:fld id="{6E72D33E-813A-6147-8BDB-1CDA0AB2F90F}" type="datetimeFigureOut">
               <a:rPr lang="en-US" smtClean="0"/>
-              <a:t>11/10/21</a:t>
+              <a:t>11/11/21</a:t>
             </a:fld>
             <a:endParaRPr lang="en-US"/>
           </a:p>
@@ -2096,7 +2096,7 @@
           <a:p>
             <a:fld id="{6E72D33E-813A-6147-8BDB-1CDA0AB2F90F}" type="datetimeFigureOut">
               <a:rPr lang="en-US" smtClean="0"/>
-              <a:t>11/10/21</a:t>
+              <a:t>11/11/21</a:t>
             </a:fld>
             <a:endParaRPr lang="en-US"/>
           </a:p>
@@ -2353,7 +2353,7 @@
           <a:p>
             <a:fld id="{6E72D33E-813A-6147-8BDB-1CDA0AB2F90F}" type="datetimeFigureOut">
               <a:rPr lang="en-US" smtClean="0"/>
-              <a:t>11/10/21</a:t>
+              <a:t>11/11/21</a:t>
             </a:fld>
             <a:endParaRPr lang="en-US"/>
           </a:p>
@@ -2566,7 +2566,7 @@
           <a:p>
             <a:fld id="{6E72D33E-813A-6147-8BDB-1CDA0AB2F90F}" type="datetimeFigureOut">
               <a:rPr lang="en-US" smtClean="0"/>
-              <a:t>11/10/21</a:t>
+              <a:t>11/11/21</a:t>
             </a:fld>
             <a:endParaRPr lang="en-US"/>
           </a:p>
@@ -3136,8 +3136,8 @@
           </a:p>
         </p:txBody>
       </p:sp>
-      <mc:AlternateContent xmlns:mc="http://schemas.openxmlformats.org/markup-compatibility/2006">
-        <mc:Choice xmlns:a14="http://schemas.microsoft.com/office/drawing/2010/main" Requires="a14">
+      <mc:AlternateContent xmlns:mc="http://schemas.openxmlformats.org/markup-compatibility/2006" xmlns:a14="http://schemas.microsoft.com/office/drawing/2010/main">
+        <mc:Choice Requires="a14">
           <p:sp>
             <p:nvSpPr>
               <p:cNvPr id="17" name="TextBox 16">
@@ -3208,7 +3208,7 @@
             </p:txBody>
           </p:sp>
         </mc:Choice>
-        <mc:Fallback>
+        <mc:Fallback xmlns="">
           <p:sp>
             <p:nvSpPr>
               <p:cNvPr id="17" name="TextBox 16">
@@ -3319,8 +3319,8 @@
           </a:p>
         </p:txBody>
       </p:sp>
-      <mc:AlternateContent xmlns:mc="http://schemas.openxmlformats.org/markup-compatibility/2006">
-        <mc:Choice xmlns:a14="http://schemas.microsoft.com/office/drawing/2010/main" Requires="a14">
+      <mc:AlternateContent xmlns:mc="http://schemas.openxmlformats.org/markup-compatibility/2006" xmlns:a14="http://schemas.microsoft.com/office/drawing/2010/main">
+        <mc:Choice Requires="a14">
           <p:sp>
             <p:nvSpPr>
               <p:cNvPr id="60" name="TextBox 59">
@@ -3390,7 +3390,7 @@
             </p:txBody>
           </p:sp>
         </mc:Choice>
-        <mc:Fallback>
+        <mc:Fallback xmlns="">
           <p:sp>
             <p:nvSpPr>
               <p:cNvPr id="60" name="TextBox 59">
@@ -3483,9 +3483,6 @@
               </a:rPr>
               <a:t>Sample of size N</a:t>
             </a:r>
-            <a:endParaRPr lang="en-US" sz="1400" dirty="0">
-              <a:latin typeface="FoundrySterling-Book" pitchFamily="2" charset="0"/>
-            </a:endParaRPr>
           </a:p>
         </p:txBody>
       </p:sp>
@@ -3533,8 +3530,8 @@
           </a:fontRef>
         </p:style>
       </p:cxnSp>
-      <mc:AlternateContent xmlns:mc="http://schemas.openxmlformats.org/markup-compatibility/2006">
-        <mc:Choice xmlns:a14="http://schemas.microsoft.com/office/drawing/2010/main" Requires="a14">
+      <mc:AlternateContent xmlns:mc="http://schemas.openxmlformats.org/markup-compatibility/2006" xmlns:a14="http://schemas.microsoft.com/office/drawing/2010/main">
+        <mc:Choice Requires="a14">
           <p:sp>
             <p:nvSpPr>
               <p:cNvPr id="68" name="TextBox 67">
@@ -3679,7 +3676,7 @@
             </p:txBody>
           </p:sp>
         </mc:Choice>
-        <mc:Fallback>
+        <mc:Fallback xmlns="">
           <p:sp>
             <p:nvSpPr>
               <p:cNvPr id="68" name="TextBox 67">
@@ -3724,8 +3721,8 @@
           </p:sp>
         </mc:Fallback>
       </mc:AlternateContent>
-      <mc:AlternateContent xmlns:mc="http://schemas.openxmlformats.org/markup-compatibility/2006">
-        <mc:Choice xmlns:a14="http://schemas.microsoft.com/office/drawing/2010/main" Requires="a14">
+      <mc:AlternateContent xmlns:mc="http://schemas.openxmlformats.org/markup-compatibility/2006" xmlns:a14="http://schemas.microsoft.com/office/drawing/2010/main">
+        <mc:Choice Requires="a14">
           <p:sp>
             <p:nvSpPr>
               <p:cNvPr id="16" name="TextBox 15">
@@ -3754,6 +3751,7 @@
               </a:bodyPr>
               <a:lstStyle/>
               <a:p>
+                <a:pPr/>
                 <a14:m>
                   <m:oMathPara xmlns:m="http://schemas.openxmlformats.org/officeDocument/2006/math">
                     <m:oMathParaPr>
@@ -3929,7 +3927,7 @@
             </p:txBody>
           </p:sp>
         </mc:Choice>
-        <mc:Fallback>
+        <mc:Fallback xmlns="">
           <p:sp>
             <p:nvSpPr>
               <p:cNvPr id="16" name="TextBox 15">
@@ -4019,8 +4017,8 @@
           </a:fontRef>
         </p:style>
       </p:cxnSp>
-      <mc:AlternateContent xmlns:mc="http://schemas.openxmlformats.org/markup-compatibility/2006">
-        <mc:Choice xmlns:a14="http://schemas.microsoft.com/office/drawing/2010/main" Requires="a14">
+      <mc:AlternateContent xmlns:mc="http://schemas.openxmlformats.org/markup-compatibility/2006" xmlns:a14="http://schemas.microsoft.com/office/drawing/2010/main">
+        <mc:Choice Requires="a14">
           <p:sp>
             <p:nvSpPr>
               <p:cNvPr id="70" name="TextBox 69">
@@ -4081,7 +4079,7 @@
             </p:txBody>
           </p:sp>
         </mc:Choice>
-        <mc:Fallback>
+        <mc:Fallback xmlns="">
           <p:sp>
             <p:nvSpPr>
               <p:cNvPr id="70" name="TextBox 69">
@@ -4381,8 +4379,8 @@
           </a:p>
         </p:txBody>
       </p:sp>
-      <mc:AlternateContent xmlns:mc="http://schemas.openxmlformats.org/markup-compatibility/2006">
-        <mc:Choice xmlns:a14="http://schemas.microsoft.com/office/drawing/2010/main" Requires="a14">
+      <mc:AlternateContent xmlns:mc="http://schemas.openxmlformats.org/markup-compatibility/2006" xmlns:a14="http://schemas.microsoft.com/office/drawing/2010/main">
+        <mc:Choice Requires="a14">
           <p:sp>
             <p:nvSpPr>
               <p:cNvPr id="78" name="TextBox 77">
@@ -4443,7 +4441,7 @@
             </p:txBody>
           </p:sp>
         </mc:Choice>
-        <mc:Fallback>
+        <mc:Fallback xmlns="">
           <p:sp>
             <p:nvSpPr>
               <p:cNvPr id="78" name="TextBox 77">
@@ -4574,8 +4572,8 @@
           </a:fontRef>
         </p:style>
       </p:cxnSp>
-      <mc:AlternateContent xmlns:mc="http://schemas.openxmlformats.org/markup-compatibility/2006">
-        <mc:Choice xmlns:a14="http://schemas.microsoft.com/office/drawing/2010/main" Requires="a14">
+      <mc:AlternateContent xmlns:mc="http://schemas.openxmlformats.org/markup-compatibility/2006" xmlns:a14="http://schemas.microsoft.com/office/drawing/2010/main">
+        <mc:Choice Requires="a14">
           <p:sp>
             <p:nvSpPr>
               <p:cNvPr id="80" name="TextBox 79">
@@ -4653,17 +4651,11 @@
                   </a:rPr>
                   <a:t>).</a:t>
                 </a:r>
-                <a:endParaRPr lang="en-US" sz="800" dirty="0">
-                  <a:solidFill>
-                    <a:srgbClr val="C00000"/>
-                  </a:solidFill>
-                  <a:latin typeface="FoundrySterling-Book" pitchFamily="2" charset="0"/>
-                </a:endParaRPr>
               </a:p>
             </p:txBody>
           </p:sp>
         </mc:Choice>
-        <mc:Fallback>
+        <mc:Fallback xmlns="">
           <p:sp>
             <p:nvSpPr>
               <p:cNvPr id="80" name="TextBox 79">
@@ -5182,12 +5174,6 @@
               </a:rPr>
               <a:t>Number of possible routes is given by Pascal’s triangle:</a:t>
             </a:r>
-            <a:endParaRPr lang="en-US" sz="800" dirty="0">
-              <a:solidFill>
-                <a:srgbClr val="C00000"/>
-              </a:solidFill>
-              <a:latin typeface="FoundrySterling-Book" pitchFamily="2" charset="0"/>
-            </a:endParaRPr>
           </a:p>
         </p:txBody>
       </p:sp>
@@ -5433,8 +5419,8 @@
           </a:fontRef>
         </p:style>
       </p:cxnSp>
-      <mc:AlternateContent xmlns:mc="http://schemas.openxmlformats.org/markup-compatibility/2006">
-        <mc:Choice xmlns:a14="http://schemas.microsoft.com/office/drawing/2010/main" Requires="a14">
+      <mc:AlternateContent xmlns:mc="http://schemas.openxmlformats.org/markup-compatibility/2006" xmlns:a14="http://schemas.microsoft.com/office/drawing/2010/main">
+        <mc:Choice Requires="a14">
           <p:sp>
             <p:nvSpPr>
               <p:cNvPr id="94" name="TextBox 93">
@@ -5641,7 +5627,7 @@
             </p:txBody>
           </p:sp>
         </mc:Choice>
-        <mc:Fallback>
+        <mc:Fallback xmlns="">
           <p:sp>
             <p:nvSpPr>
               <p:cNvPr id="94" name="TextBox 93">
@@ -5792,8 +5778,8 @@
         </p:nvCxnSpPr>
         <p:spPr>
           <a:xfrm>
-            <a:off x="4165416" y="7241122"/>
-            <a:ext cx="4659942" cy="0"/>
+            <a:off x="631629" y="7241122"/>
+            <a:ext cx="11339578" cy="0"/>
           </a:xfrm>
           <a:prstGeom prst="line">
             <a:avLst/>
@@ -5819,8 +5805,8 @@
           </a:fontRef>
         </p:style>
       </p:cxnSp>
-      <mc:AlternateContent xmlns:mc="http://schemas.openxmlformats.org/markup-compatibility/2006">
-        <mc:Choice xmlns:a14="http://schemas.microsoft.com/office/drawing/2010/main" Requires="a14">
+      <mc:AlternateContent xmlns:mc="http://schemas.openxmlformats.org/markup-compatibility/2006" xmlns:a14="http://schemas.microsoft.com/office/drawing/2010/main">
+        <mc:Choice Requires="a14">
           <p:sp>
             <p:nvSpPr>
               <p:cNvPr id="108" name="TextBox 107">
@@ -5899,7 +5885,7 @@
             </p:txBody>
           </p:sp>
         </mc:Choice>
-        <mc:Fallback>
+        <mc:Fallback xmlns="">
           <p:sp>
             <p:nvSpPr>
               <p:cNvPr id="108" name="TextBox 107">
@@ -5944,8 +5930,8 @@
           </p:sp>
         </mc:Fallback>
       </mc:AlternateContent>
-      <mc:AlternateContent xmlns:mc="http://schemas.openxmlformats.org/markup-compatibility/2006">
-        <mc:Choice xmlns:a14="http://schemas.microsoft.com/office/drawing/2010/main" Requires="a14">
+      <mc:AlternateContent xmlns:mc="http://schemas.openxmlformats.org/markup-compatibility/2006" xmlns:a14="http://schemas.microsoft.com/office/drawing/2010/main">
+        <mc:Choice Requires="a14">
           <p:sp>
             <p:nvSpPr>
               <p:cNvPr id="109" name="TextBox 108">
@@ -6021,7 +6007,7 @@
             </p:txBody>
           </p:sp>
         </mc:Choice>
-        <mc:Fallback>
+        <mc:Fallback xmlns="">
           <p:sp>
             <p:nvSpPr>
               <p:cNvPr id="109" name="TextBox 108">
@@ -6327,8 +6313,8 @@
             </p:txBody>
           </p:sp>
         </p:grpSp>
-        <mc:AlternateContent xmlns:mc="http://schemas.openxmlformats.org/markup-compatibility/2006">
-          <mc:Choice xmlns:a14="http://schemas.microsoft.com/office/drawing/2010/main" Requires="a14">
+        <mc:AlternateContent xmlns:mc="http://schemas.openxmlformats.org/markup-compatibility/2006" xmlns:a14="http://schemas.microsoft.com/office/drawing/2010/main">
+          <mc:Choice Requires="a14">
             <p:sp>
               <p:nvSpPr>
                 <p:cNvPr id="110" name="TextBox 109">
@@ -6453,17 +6439,11 @@
                     </a:rPr>
                     <a:t> grows</a:t>
                   </a:r>
-                  <a:endParaRPr lang="en-US" sz="800" dirty="0">
-                    <a:solidFill>
-                      <a:srgbClr val="C00000"/>
-                    </a:solidFill>
-                    <a:latin typeface="FoundrySterling-Book" pitchFamily="2" charset="0"/>
-                  </a:endParaRPr>
                 </a:p>
               </p:txBody>
             </p:sp>
           </mc:Choice>
-          <mc:Fallback>
+          <mc:Fallback xmlns="">
             <p:sp>
               <p:nvSpPr>
                 <p:cNvPr id="110" name="TextBox 109">
@@ -6619,7 +6599,7 @@
             </p:nvSpPr>
             <p:spPr>
               <a:xfrm>
-                <a:off x="7236442" y="7704254"/>
+                <a:off x="7236442" y="7646198"/>
                 <a:ext cx="3851820" cy="441980"/>
               </a:xfrm>
               <a:prstGeom prst="rect">
@@ -6633,6 +6613,7 @@
               </a:bodyPr>
               <a:lstStyle/>
               <a:p>
+                <a:pPr/>
                 <a14:m>
                   <m:oMathPara xmlns:m="http://schemas.openxmlformats.org/officeDocument/2006/math">
                     <m:oMathParaPr>
@@ -6651,7 +6632,7 @@
                       <m:d>
                         <m:dPr>
                           <m:ctrlPr>
-                            <a:rPr lang="en-US" sz="1200" b="0" i="0" dirty="0" smtClean="0">
+                            <a:rPr lang="en-US" sz="1200" b="0" i="1" dirty="0" smtClean="0">
                               <a:latin typeface="Cambria Math" panose="02040503050406030204" pitchFamily="18" charset="0"/>
                             </a:rPr>
                           </m:ctrlPr>
@@ -6805,7 +6786,7 @@
             </p:nvSpPr>
             <p:spPr>
               <a:xfrm>
-                <a:off x="7236442" y="7704254"/>
+                <a:off x="7236442" y="7646198"/>
                 <a:ext cx="3851820" cy="441980"/>
               </a:xfrm>
               <a:prstGeom prst="rect">
@@ -6833,8 +6814,8 @@
           </p:sp>
         </mc:Fallback>
       </mc:AlternateContent>
-      <mc:AlternateContent xmlns:mc="http://schemas.openxmlformats.org/markup-compatibility/2006">
-        <mc:Choice xmlns:a14="http://schemas.microsoft.com/office/drawing/2010/main" Requires="a14">
+      <mc:AlternateContent xmlns:mc="http://schemas.openxmlformats.org/markup-compatibility/2006" xmlns:a14="http://schemas.microsoft.com/office/drawing/2010/main">
+        <mc:Choice Requires="a14">
           <p:sp>
             <p:nvSpPr>
               <p:cNvPr id="116" name="TextBox 115">
@@ -6863,6 +6844,7 @@
               </a:bodyPr>
               <a:lstStyle/>
               <a:p>
+                <a:pPr/>
                 <a14:m>
                   <m:oMathPara xmlns:m="http://schemas.openxmlformats.org/officeDocument/2006/math">
                     <m:oMathParaPr>
@@ -6975,7 +6957,7 @@
             </p:txBody>
           </p:sp>
         </mc:Choice>
-        <mc:Fallback>
+        <mc:Fallback xmlns="">
           <p:sp>
             <p:nvSpPr>
               <p:cNvPr id="116" name="TextBox 115">
@@ -7036,7 +7018,7 @@
             </p:nvSpPr>
             <p:spPr>
               <a:xfrm>
-                <a:off x="6431080" y="7789840"/>
+                <a:off x="6431080" y="7731784"/>
                 <a:ext cx="1444626" cy="276999"/>
               </a:xfrm>
               <a:prstGeom prst="rect">
@@ -7118,7 +7100,7 @@
             </p:nvSpPr>
             <p:spPr>
               <a:xfrm>
-                <a:off x="6431080" y="7789840"/>
+                <a:off x="6431080" y="7731784"/>
                 <a:ext cx="1444626" cy="276999"/>
               </a:xfrm>
               <a:prstGeom prst="rect">
@@ -7127,7 +7109,7 @@
               <a:blipFill>
                 <a:blip r:embed="rId25"/>
                 <a:stretch>
-                  <a:fillRect b="-4348"/>
+                  <a:fillRect b="-8696"/>
                 </a:stretch>
               </a:blipFill>
             </p:spPr>
@@ -7183,8 +7165,8 @@
           </a:p>
         </p:txBody>
       </p:sp>
-      <mc:AlternateContent xmlns:mc="http://schemas.openxmlformats.org/markup-compatibility/2006">
-        <mc:Choice xmlns:a14="http://schemas.microsoft.com/office/drawing/2010/main" Requires="a14">
+      <mc:AlternateContent xmlns:mc="http://schemas.openxmlformats.org/markup-compatibility/2006" xmlns:a14="http://schemas.microsoft.com/office/drawing/2010/main">
+        <mc:Choice Requires="a14">
           <p:sp>
             <p:nvSpPr>
               <p:cNvPr id="121" name="TextBox 120">
@@ -7286,17 +7268,11 @@
                   </a:rPr>
                   <a:t> is some value that doesn’t depend on the data or parameters.)</a:t>
                 </a:r>
-                <a:endParaRPr lang="en-US" sz="800" dirty="0">
-                  <a:solidFill>
-                    <a:srgbClr val="C00000"/>
-                  </a:solidFill>
-                  <a:latin typeface="FoundrySterling-Book" pitchFamily="2" charset="0"/>
-                </a:endParaRPr>
               </a:p>
             </p:txBody>
           </p:sp>
         </mc:Choice>
-        <mc:Fallback>
+        <mc:Fallback xmlns="">
           <p:sp>
             <p:nvSpPr>
               <p:cNvPr id="121" name="TextBox 120">
@@ -7402,7 +7378,7 @@
         </p:nvCxnSpPr>
         <p:spPr>
           <a:xfrm flipH="1" flipV="1">
-            <a:off x="10221530" y="7953949"/>
+            <a:off x="10221530" y="7910407"/>
             <a:ext cx="388740" cy="52807"/>
           </a:xfrm>
           <a:prstGeom prst="straightConnector1">
@@ -7477,25 +7453,7 @@
               <a:rPr lang="en-US" sz="1000" dirty="0">
                 <a:latin typeface="FoundrySterling-Book" pitchFamily="2" charset="0"/>
               </a:rPr>
-              <a:t>(This is </a:t>
-            </a:r>
-            <a:r>
-              <a:rPr lang="en-US" sz="1000" dirty="0">
-                <a:latin typeface="FoundrySterling-Book" pitchFamily="2" charset="0"/>
-              </a:rPr>
-              <a:t>indeed how standard </a:t>
-            </a:r>
-            <a:r>
-              <a:rPr lang="en-US" sz="1000" dirty="0">
-                <a:latin typeface="FoundrySterling-Book" pitchFamily="2" charset="0"/>
-              </a:rPr>
-              <a:t>errors and P-values in </a:t>
-            </a:r>
-            <a:r>
-              <a:rPr lang="en-US" sz="1000" dirty="0">
-                <a:latin typeface="FoundrySterling-Book" pitchFamily="2" charset="0"/>
-              </a:rPr>
-              <a:t>functions like </a:t>
+              <a:t>(This is indeed how standard errors and P-values in functions like </a:t>
             </a:r>
             <a:r>
               <a:rPr lang="en-US" sz="1000" dirty="0" err="1">
@@ -7513,13 +7471,7 @@
               <a:rPr lang="en-US" sz="1000" dirty="0">
                 <a:latin typeface="FoundrySterling-Book" pitchFamily="2" charset="0"/>
               </a:rPr>
-              <a:t> and</a:t>
-            </a:r>
-            <a:r>
-              <a:rPr lang="en-US" sz="1000" dirty="0">
-                <a:latin typeface="FoundrySterling-Book" pitchFamily="2" charset="0"/>
-              </a:rPr>
-              <a:t> </a:t>
+              <a:t> and </a:t>
             </a:r>
             <a:r>
               <a:rPr lang="en-US" sz="1000" dirty="0" err="1">
@@ -7585,8 +7537,8 @@
           </a:p>
         </p:txBody>
       </p:sp>
-      <mc:AlternateContent xmlns:mc="http://schemas.openxmlformats.org/markup-compatibility/2006">
-        <mc:Choice xmlns:a14="http://schemas.microsoft.com/office/drawing/2010/main" Requires="a14">
+      <mc:AlternateContent xmlns:mc="http://schemas.openxmlformats.org/markup-compatibility/2006" xmlns:a14="http://schemas.microsoft.com/office/drawing/2010/main">
+        <mc:Choice Requires="a14">
           <p:sp>
             <p:nvSpPr>
               <p:cNvPr id="129" name="Rectangle 128">
@@ -7643,7 +7595,7 @@
             </p:txBody>
           </p:sp>
         </mc:Choice>
-        <mc:Fallback>
+        <mc:Fallback xmlns="">
           <p:sp>
             <p:nvSpPr>
               <p:cNvPr id="129" name="Rectangle 128">
@@ -7794,8 +7746,8 @@
           </a:p>
         </p:txBody>
       </p:sp>
-      <mc:AlternateContent xmlns:mc="http://schemas.openxmlformats.org/markup-compatibility/2006">
-        <mc:Choice xmlns:a14="http://schemas.microsoft.com/office/drawing/2010/main" Requires="a14">
+      <mc:AlternateContent xmlns:mc="http://schemas.openxmlformats.org/markup-compatibility/2006" xmlns:a14="http://schemas.microsoft.com/office/drawing/2010/main">
+        <mc:Choice Requires="a14">
           <p:sp>
             <p:nvSpPr>
               <p:cNvPr id="138" name="TextBox 137">
@@ -7899,7 +7851,7 @@
             </p:txBody>
           </p:sp>
         </mc:Choice>
-        <mc:Fallback>
+        <mc:Fallback xmlns="">
           <p:sp>
             <p:nvSpPr>
               <p:cNvPr id="138" name="TextBox 137">
@@ -7989,8 +7941,8 @@
           </a:fontRef>
         </p:style>
       </p:cxnSp>
-      <mc:AlternateContent xmlns:mc="http://schemas.openxmlformats.org/markup-compatibility/2006">
-        <mc:Choice xmlns:a14="http://schemas.microsoft.com/office/drawing/2010/main" Requires="a14">
+      <mc:AlternateContent xmlns:mc="http://schemas.openxmlformats.org/markup-compatibility/2006" xmlns:a14="http://schemas.microsoft.com/office/drawing/2010/main">
+        <mc:Choice Requires="a14">
           <p:sp>
             <p:nvSpPr>
               <p:cNvPr id="141" name="TextBox 140">
@@ -8049,7 +8001,7 @@
             </p:txBody>
           </p:sp>
         </mc:Choice>
-        <mc:Fallback>
+        <mc:Fallback xmlns="">
           <p:sp>
             <p:nvSpPr>
               <p:cNvPr id="141" name="TextBox 140">
@@ -8140,8 +8092,8 @@
           </a:fontRef>
         </p:style>
       </p:cxnSp>
-      <mc:AlternateContent xmlns:mc="http://schemas.openxmlformats.org/markup-compatibility/2006">
-        <mc:Choice xmlns:a14="http://schemas.microsoft.com/office/drawing/2010/main" Requires="a14">
+      <mc:AlternateContent xmlns:mc="http://schemas.openxmlformats.org/markup-compatibility/2006" xmlns:a14="http://schemas.microsoft.com/office/drawing/2010/main">
+        <mc:Choice Requires="a14">
           <p:sp>
             <p:nvSpPr>
               <p:cNvPr id="147" name="TextBox 146">
@@ -8274,7 +8226,7 @@
             </p:txBody>
           </p:sp>
         </mc:Choice>
-        <mc:Fallback>
+        <mc:Fallback xmlns="">
           <p:sp>
             <p:nvSpPr>
               <p:cNvPr id="147" name="TextBox 146">
@@ -8409,8 +8361,8 @@
           </a:fontRef>
         </p:style>
       </p:cxnSp>
-      <mc:AlternateContent xmlns:mc="http://schemas.openxmlformats.org/markup-compatibility/2006">
-        <mc:Choice xmlns:a14="http://schemas.microsoft.com/office/drawing/2010/main" Requires="a14">
+      <mc:AlternateContent xmlns:mc="http://schemas.openxmlformats.org/markup-compatibility/2006" xmlns:a14="http://schemas.microsoft.com/office/drawing/2010/main">
+        <mc:Choice Requires="a14">
           <p:sp>
             <p:nvSpPr>
               <p:cNvPr id="150" name="TextBox 149">
@@ -8569,7 +8521,7 @@
             </p:txBody>
           </p:sp>
         </mc:Choice>
-        <mc:Fallback>
+        <mc:Fallback xmlns="">
           <p:sp>
             <p:nvSpPr>
               <p:cNvPr id="150" name="TextBox 149">
@@ -8614,8 +8566,8 @@
           </p:sp>
         </mc:Fallback>
       </mc:AlternateContent>
-      <mc:AlternateContent xmlns:mc="http://schemas.openxmlformats.org/markup-compatibility/2006">
-        <mc:Choice xmlns:a14="http://schemas.microsoft.com/office/drawing/2010/main" Requires="a14">
+      <mc:AlternateContent xmlns:mc="http://schemas.openxmlformats.org/markup-compatibility/2006" xmlns:a14="http://schemas.microsoft.com/office/drawing/2010/main">
+        <mc:Choice Requires="a14">
           <p:sp>
             <p:nvSpPr>
               <p:cNvPr id="151" name="TextBox 150">
@@ -8706,14 +8658,11 @@
                   </a:rPr>
                   <a:t>.</a:t>
                 </a:r>
-                <a:endParaRPr lang="en-US" sz="1000" dirty="0">
-                  <a:latin typeface="FoundrySterling-Book" pitchFamily="2" charset="0"/>
-                </a:endParaRPr>
               </a:p>
             </p:txBody>
           </p:sp>
         </mc:Choice>
-        <mc:Fallback>
+        <mc:Fallback xmlns="">
           <p:sp>
             <p:nvSpPr>
               <p:cNvPr id="151" name="TextBox 150">

</xml_diff>

<commit_message>
Sampling cheatsheet: slight update
</commit_message>
<xml_diff>
--- a/Statistical_modelling/Introduction/notes/Sampling and asymptotics cheatsheet.pptx
+++ b/Statistical_modelling/Introduction/notes/Sampling and asymptotics cheatsheet.pptx
@@ -3530,8 +3530,8 @@
           </a:fontRef>
         </p:style>
       </p:cxnSp>
-      <mc:AlternateContent xmlns:mc="http://schemas.openxmlformats.org/markup-compatibility/2006" xmlns:a14="http://schemas.microsoft.com/office/drawing/2010/main">
-        <mc:Choice Requires="a14">
+      <mc:AlternateContent xmlns:mc="http://schemas.openxmlformats.org/markup-compatibility/2006">
+        <mc:Choice xmlns:a14="http://schemas.microsoft.com/office/drawing/2010/main" Requires="a14">
           <p:sp>
             <p:nvSpPr>
               <p:cNvPr id="68" name="TextBox 67">
@@ -3617,7 +3617,7 @@
                   <a:rPr lang="en-GB" sz="1200" dirty="0">
                     <a:latin typeface="FoundrySterling-Book" pitchFamily="2" charset="0"/>
                   </a:rPr>
-                  <a:t>”), then the number has  a “</a:t>
+                  <a:t>”), then the number has a “</a:t>
                 </a:r>
                 <a:r>
                   <a:rPr lang="en-GB" sz="1200" b="1" dirty="0">
@@ -3654,7 +3654,7 @@
                   <a:rPr lang="en-GB" sz="1200" dirty="0">
                     <a:latin typeface="FoundrySterling-Book" pitchFamily="2" charset="0"/>
                   </a:rPr>
-                  <a:t> instead – that is, we can use the much simpler </a:t>
+                  <a:t> instead – allowing us to model using the much simpler </a:t>
                 </a:r>
                 <a:r>
                   <a:rPr lang="en-GB" sz="1200" b="1" dirty="0">
@@ -3667,7 +3667,7 @@
                   <a:rPr lang="en-GB" sz="1200" dirty="0">
                     <a:latin typeface="FoundrySterling-Book" pitchFamily="2" charset="0"/>
                   </a:rPr>
-                  <a:t>:</a:t>
+                  <a:t>.</a:t>
                 </a:r>
                 <a:endParaRPr lang="en-US" sz="1200" b="1" dirty="0">
                   <a:latin typeface="FoundrySterling-Book" pitchFamily="2" charset="0"/>
@@ -3676,7 +3676,7 @@
             </p:txBody>
           </p:sp>
         </mc:Choice>
-        <mc:Fallback xmlns="">
+        <mc:Fallback>
           <p:sp>
             <p:nvSpPr>
               <p:cNvPr id="68" name="TextBox 67">
@@ -5687,7 +5687,7 @@
         <p:spPr>
           <a:xfrm>
             <a:off x="6431080" y="4121066"/>
-            <a:ext cx="5828960" cy="461665"/>
+            <a:ext cx="5828960" cy="738664"/>
           </a:xfrm>
           <a:prstGeom prst="rect">
             <a:avLst/>
@@ -5718,6 +5718,43 @@
                 <a:latin typeface="FoundrySterling-Book" pitchFamily="2" charset="0"/>
               </a:rPr>
               <a:t>.  An important consequence is the asymptotic theory of likelihoods explained below.</a:t>
+            </a:r>
+          </a:p>
+          <a:p>
+            <a:endParaRPr lang="en-GB" sz="600" dirty="0">
+              <a:latin typeface="FoundrySterling-Book" pitchFamily="2" charset="0"/>
+            </a:endParaRPr>
+          </a:p>
+          <a:p>
+            <a:r>
+              <a:rPr lang="en-GB" sz="1200" dirty="0">
+                <a:latin typeface="FoundrySterling-Book" pitchFamily="2" charset="0"/>
+              </a:rPr>
+              <a:t>This is in fact how tools like </a:t>
+            </a:r>
+            <a:r>
+              <a:rPr lang="en-GB" sz="1200" dirty="0" err="1">
+                <a:latin typeface="Courier" pitchFamily="2" charset="0"/>
+              </a:rPr>
+              <a:t>glm</a:t>
+            </a:r>
+            <a:r>
+              <a:rPr lang="en-GB" sz="1200">
+                <a:latin typeface="Courier" pitchFamily="2" charset="0"/>
+              </a:rPr>
+              <a:t>()</a:t>
+            </a:r>
+            <a:r>
+              <a:rPr lang="en-GB" sz="1200">
+                <a:latin typeface="FoundrySterling-Book" pitchFamily="2" charset="0"/>
+              </a:rPr>
+              <a:t> compute </a:t>
+            </a:r>
+            <a:r>
+              <a:rPr lang="en-GB" sz="1200" dirty="0">
+                <a:latin typeface="FoundrySterling-Book" pitchFamily="2" charset="0"/>
+              </a:rPr>
+              <a:t>their output – here’s an example:</a:t>
             </a:r>
             <a:endParaRPr lang="en-US" sz="1200" dirty="0">
               <a:latin typeface="FoundrySterling-Book" pitchFamily="2" charset="0"/>
@@ -8707,64 +8744,6 @@
           </p:sp>
         </mc:Fallback>
       </mc:AlternateContent>
-      <p:sp>
-        <p:nvSpPr>
-          <p:cNvPr id="152" name="TextBox 151">
-            <a:extLst>
-              <a:ext uri="{FF2B5EF4-FFF2-40B4-BE49-F238E27FC236}">
-                <a16:creationId xmlns:a16="http://schemas.microsoft.com/office/drawing/2014/main" id="{CD9A74A8-8DD6-F04A-849B-98B8F7B2C013}"/>
-              </a:ext>
-            </a:extLst>
-          </p:cNvPr>
-          <p:cNvSpPr txBox="1"/>
-          <p:nvPr/>
-        </p:nvSpPr>
-        <p:spPr>
-          <a:xfrm>
-            <a:off x="6431080" y="4661708"/>
-            <a:ext cx="5828960" cy="276999"/>
-          </a:xfrm>
-          <a:prstGeom prst="rect">
-            <a:avLst/>
-          </a:prstGeom>
-          <a:noFill/>
-        </p:spPr>
-        <p:txBody>
-          <a:bodyPr wrap="square" rtlCol="0">
-            <a:spAutoFit/>
-          </a:bodyPr>
-          <a:lstStyle/>
-          <a:p>
-            <a:r>
-              <a:rPr lang="en-GB" sz="1200" dirty="0">
-                <a:latin typeface="FoundrySterling-Book" pitchFamily="2" charset="0"/>
-              </a:rPr>
-              <a:t>Example for </a:t>
-            </a:r>
-            <a:r>
-              <a:rPr lang="en-GB" sz="1200" dirty="0" err="1">
-                <a:latin typeface="Courier" pitchFamily="2" charset="0"/>
-              </a:rPr>
-              <a:t>glm</a:t>
-            </a:r>
-            <a:r>
-              <a:rPr lang="en-GB" sz="1200" dirty="0">
-                <a:latin typeface="Courier" pitchFamily="2" charset="0"/>
-              </a:rPr>
-              <a:t>()</a:t>
-            </a:r>
-            <a:r>
-              <a:rPr lang="en-GB" sz="1200" dirty="0">
-                <a:latin typeface="FoundrySterling-Book" pitchFamily="2" charset="0"/>
-              </a:rPr>
-              <a:t>:</a:t>
-            </a:r>
-            <a:endParaRPr lang="en-US" sz="1200" dirty="0">
-              <a:latin typeface="FoundrySterling-Book" pitchFamily="2" charset="0"/>
-            </a:endParaRPr>
-          </a:p>
-        </p:txBody>
-      </p:sp>
     </p:spTree>
     <p:extLst>
       <p:ext uri="{BB962C8B-B14F-4D97-AF65-F5344CB8AC3E}">

</xml_diff>